<commit_message>
wpay msg adjustments to match state diagram
</commit_message>
<xml_diff>
--- a/webpayment.resources/docs/pullmode.pptx
+++ b/webpayment.resources/docs/pullmode.pptx
@@ -2483,6 +2483,100 @@
           <a:chExt cx="0" cy="0"/>
         </a:xfrm>
       </p:grpSpPr>
+      <p:cxnSp>
+        <p:nvCxnSpPr>
+          <p:cNvPr id="108" name="Straight Connector 107"/>
+          <p:cNvCxnSpPr/>
+          <p:nvPr/>
+        </p:nvCxnSpPr>
+        <p:spPr>
+          <a:xfrm flipH="1">
+            <a:off x="2800257" y="809837"/>
+            <a:ext cx="3073" cy="11115728"/>
+          </a:xfrm>
+          <a:prstGeom prst="line">
+            <a:avLst/>
+          </a:prstGeom>
+          <a:ln w="25400"/>
+        </p:spPr>
+        <p:style>
+          <a:lnRef idx="1">
+            <a:schemeClr val="accent1"/>
+          </a:lnRef>
+          <a:fillRef idx="0">
+            <a:schemeClr val="accent1"/>
+          </a:fillRef>
+          <a:effectRef idx="0">
+            <a:schemeClr val="accent1"/>
+          </a:effectRef>
+          <a:fontRef idx="minor">
+            <a:schemeClr val="tx1"/>
+          </a:fontRef>
+        </p:style>
+      </p:cxnSp>
+      <p:sp>
+        <p:nvSpPr>
+          <p:cNvPr id="99" name="TextBox 98"/>
+          <p:cNvSpPr txBox="1"/>
+          <p:nvPr/>
+        </p:nvSpPr>
+        <p:spPr>
+          <a:xfrm>
+            <a:off x="1649245" y="7673826"/>
+            <a:ext cx="1837872" cy="221018"/>
+          </a:xfrm>
+          <a:prstGeom prst="rect">
+            <a:avLst/>
+          </a:prstGeom>
+          <a:solidFill>
+            <a:schemeClr val="bg1"/>
+          </a:solidFill>
+        </p:spPr>
+        <p:txBody>
+          <a:bodyPr wrap="square" lIns="36000" tIns="18000" rIns="36000" bIns="18000" rtlCol="0" anchor="ctr" anchorCtr="1">
+            <a:spAutoFit/>
+          </a:bodyPr>
+          <a:lstStyle/>
+          <a:p>
+            <a:pPr algn="ctr"/>
+            <a:r>
+              <a:rPr lang="en-US" sz="1200" b="1" dirty="0" smtClean="0">
+                <a:latin typeface="Arial" panose="020B0604020202020204" pitchFamily="34" charset="0"/>
+                <a:cs typeface="Arial" panose="020B0604020202020204" pitchFamily="34" charset="0"/>
+                <a:sym typeface="Wingdings"/>
+              </a:rPr>
+              <a:t></a:t>
+            </a:r>
+            <a:r>
+              <a:rPr lang="en-US" sz="1000" dirty="0" smtClean="0">
+                <a:solidFill>
+                  <a:schemeClr val="accent1"/>
+                </a:solidFill>
+                <a:latin typeface="Arial" panose="020B0604020202020204" pitchFamily="34" charset="0"/>
+                <a:cs typeface="Arial" panose="020B0604020202020204" pitchFamily="34" charset="0"/>
+              </a:rPr>
+              <a:t> </a:t>
+            </a:r>
+            <a:r>
+              <a:rPr lang="en-US" sz="1000" dirty="0" err="1" smtClean="0">
+                <a:solidFill>
+                  <a:schemeClr val="accent1"/>
+                </a:solidFill>
+                <a:latin typeface="Arial" panose="020B0604020202020204" pitchFamily="34" charset="0"/>
+                <a:cs typeface="Arial" panose="020B0604020202020204" pitchFamily="34" charset="0"/>
+              </a:rPr>
+              <a:t>PayerPullAuthReq</a:t>
+            </a:r>
+            <a:endParaRPr lang="en-US" sz="1000" dirty="0">
+              <a:solidFill>
+                <a:schemeClr val="accent1"/>
+              </a:solidFill>
+              <a:latin typeface="Arial" panose="020B0604020202020204" pitchFamily="34" charset="0"/>
+              <a:cs typeface="Arial" panose="020B0604020202020204" pitchFamily="34" charset="0"/>
+            </a:endParaRPr>
+          </a:p>
+        </p:txBody>
+      </p:sp>
       <p:cxnSp>
         <p:nvCxnSpPr>
           <p:cNvPr id="42" name="Straight Connector 41"/>
@@ -10865,7 +10959,7 @@
         <p:spPr>
           <a:xfrm>
             <a:off x="1379646" y="11412889"/>
-            <a:ext cx="1038766" cy="6653"/>
+            <a:ext cx="1422000" cy="6653"/>
           </a:xfrm>
           <a:prstGeom prst="straightConnector1">
             <a:avLst/>
@@ -10895,45 +10989,14 @@
       </p:cxnSp>
       <p:cxnSp>
         <p:nvCxnSpPr>
-          <p:cNvPr id="108" name="Straight Connector 107"/>
-          <p:cNvCxnSpPr/>
-          <p:nvPr/>
-        </p:nvCxnSpPr>
-        <p:spPr>
-          <a:xfrm flipH="1">
-            <a:off x="2800257" y="809837"/>
-            <a:ext cx="3073" cy="11115728"/>
-          </a:xfrm>
-          <a:prstGeom prst="line">
-            <a:avLst/>
-          </a:prstGeom>
-          <a:ln w="25400"/>
-        </p:spPr>
-        <p:style>
-          <a:lnRef idx="1">
-            <a:schemeClr val="accent1"/>
-          </a:lnRef>
-          <a:fillRef idx="0">
-            <a:schemeClr val="accent1"/>
-          </a:fillRef>
-          <a:effectRef idx="0">
-            <a:schemeClr val="accent1"/>
-          </a:effectRef>
-          <a:fontRef idx="minor">
-            <a:schemeClr val="tx1"/>
-          </a:fontRef>
-        </p:style>
-      </p:cxnSp>
-      <p:cxnSp>
-        <p:nvCxnSpPr>
           <p:cNvPr id="86" name="Straight Arrow Connector 85"/>
           <p:cNvCxnSpPr/>
           <p:nvPr/>
         </p:nvCxnSpPr>
         <p:spPr>
           <a:xfrm>
-            <a:off x="1360755" y="8393906"/>
-            <a:ext cx="1057161" cy="2758"/>
+            <a:off x="1360754" y="8242164"/>
+            <a:ext cx="1422000" cy="2758"/>
           </a:xfrm>
           <a:prstGeom prst="straightConnector1">
             <a:avLst/>
@@ -10968,8 +11031,8 @@
         </p:nvSpPr>
         <p:spPr>
           <a:xfrm>
-            <a:off x="1229029" y="7958624"/>
-            <a:ext cx="133217" cy="432000"/>
+            <a:off x="1229029" y="7886161"/>
+            <a:ext cx="133217" cy="360000"/>
           </a:xfrm>
           <a:custGeom>
             <a:avLst/>
@@ -11208,7 +11271,7 @@
         </p:nvCxnSpPr>
         <p:spPr>
           <a:xfrm flipH="1">
-            <a:off x="1375017" y="7963510"/>
+            <a:off x="1375017" y="7891047"/>
             <a:ext cx="3111227" cy="0"/>
           </a:xfrm>
           <a:prstGeom prst="straightConnector1">
@@ -11513,8 +11576,8 @@
         </p:nvCxnSpPr>
         <p:spPr>
           <a:xfrm>
-            <a:off x="4973891" y="1800987"/>
-            <a:ext cx="0" cy="9545247"/>
+            <a:off x="4973891" y="1800986"/>
+            <a:ext cx="0" cy="9612000"/>
           </a:xfrm>
           <a:prstGeom prst="line">
             <a:avLst/>
@@ -12586,8 +12649,8 @@
         </p:nvSpPr>
         <p:spPr>
           <a:xfrm>
-            <a:off x="4486244" y="7773733"/>
-            <a:ext cx="2133092" cy="453020"/>
+            <a:off x="4486244" y="7701270"/>
+            <a:ext cx="2133092" cy="378836"/>
           </a:xfrm>
           <a:prstGeom prst="rect">
             <a:avLst/>
@@ -12643,7 +12706,7 @@
         </p:nvSpPr>
         <p:spPr>
           <a:xfrm>
-            <a:off x="4486244" y="7778861"/>
+            <a:off x="4486244" y="7706398"/>
             <a:ext cx="2235716" cy="373708"/>
           </a:xfrm>
           <a:prstGeom prst="rect">
@@ -12701,7 +12764,7 @@
         </p:nvSpPr>
         <p:spPr>
           <a:xfrm>
-            <a:off x="5239959" y="8733616"/>
+            <a:off x="5239959" y="8465914"/>
             <a:ext cx="2650879" cy="276999"/>
           </a:xfrm>
           <a:prstGeom prst="rect">
@@ -12738,51 +12801,6 @@
           </a:p>
         </p:txBody>
       </p:sp>
-      <p:sp>
-        <p:nvSpPr>
-          <p:cNvPr id="99" name="TextBox 98"/>
-          <p:cNvSpPr txBox="1"/>
-          <p:nvPr/>
-        </p:nvSpPr>
-        <p:spPr>
-          <a:xfrm>
-            <a:off x="1412590" y="7642105"/>
-            <a:ext cx="1593876" cy="190240"/>
-          </a:xfrm>
-          <a:prstGeom prst="rect">
-            <a:avLst/>
-          </a:prstGeom>
-          <a:solidFill>
-            <a:schemeClr val="bg1"/>
-          </a:solidFill>
-        </p:spPr>
-        <p:txBody>
-          <a:bodyPr wrap="square" lIns="36000" tIns="18000" rIns="36000" bIns="18000" rtlCol="0" anchor="ctr" anchorCtr="1">
-            <a:spAutoFit/>
-          </a:bodyPr>
-          <a:lstStyle/>
-          <a:p>
-            <a:r>
-              <a:rPr lang="en-US" sz="1000" dirty="0" err="1" smtClean="0">
-                <a:latin typeface="Arial" panose="020B0604020202020204" pitchFamily="34" charset="0"/>
-                <a:cs typeface="Arial" panose="020B0604020202020204" pitchFamily="34" charset="0"/>
-              </a:rPr>
-              <a:t>postMessage</a:t>
-            </a:r>
-            <a:r>
-              <a:rPr lang="en-US" sz="1000" dirty="0" smtClean="0">
-                <a:latin typeface="Arial" panose="020B0604020202020204" pitchFamily="34" charset="0"/>
-                <a:cs typeface="Arial" panose="020B0604020202020204" pitchFamily="34" charset="0"/>
-              </a:rPr>
-              <a:t>(Authorize)</a:t>
-            </a:r>
-            <a:endParaRPr lang="en-US" sz="1000" dirty="0">
-              <a:latin typeface="Arial" panose="020B0604020202020204" pitchFamily="34" charset="0"/>
-              <a:cs typeface="Arial" panose="020B0604020202020204" pitchFamily="34" charset="0"/>
-            </a:endParaRPr>
-          </a:p>
-        </p:txBody>
-      </p:sp>
       <p:cxnSp>
         <p:nvCxnSpPr>
           <p:cNvPr id="106" name="Straight Arrow Connector 105"/>
@@ -12791,8 +12809,8 @@
         </p:nvCxnSpPr>
         <p:spPr>
           <a:xfrm flipH="1">
-            <a:off x="2454512" y="10266114"/>
-            <a:ext cx="5054346" cy="0"/>
+            <a:off x="2827580" y="10183570"/>
+            <a:ext cx="3960000" cy="0"/>
           </a:xfrm>
           <a:prstGeom prst="straightConnector1">
             <a:avLst/>
@@ -12819,484 +12837,310 @@
           </a:fontRef>
         </p:style>
       </p:cxnSp>
-      <p:grpSp>
-        <p:nvGrpSpPr>
-          <p:cNvPr id="25" name="Group 24"/>
-          <p:cNvGrpSpPr/>
+      <p:sp>
+        <p:nvSpPr>
+          <p:cNvPr id="26" name="Rectangle 25"/>
+          <p:cNvSpPr/>
           <p:nvPr/>
-        </p:nvGrpSpPr>
-        <p:grpSpPr>
+        </p:nvSpPr>
+        <p:spPr>
           <a:xfrm>
-            <a:off x="6580336" y="9350915"/>
-            <a:ext cx="1946367" cy="2283351"/>
-            <a:chOff x="4437111" y="3445770"/>
-            <a:chExt cx="1948397" cy="2060069"/>
+            <a:off x="6580336" y="9041978"/>
+            <a:ext cx="1946367" cy="2615751"/>
           </a:xfrm>
-          <a:effectLst>
-            <a:outerShdw blurRad="50800" dist="38100" dir="2700000" algn="tl" rotWithShape="0">
-              <a:prstClr val="black">
-                <a:alpha val="40000"/>
-              </a:prstClr>
-            </a:outerShdw>
-          </a:effectLst>
-        </p:grpSpPr>
-        <p:sp>
-          <p:nvSpPr>
-            <p:cNvPr id="26" name="Rectangle 25"/>
-            <p:cNvSpPr/>
-            <p:nvPr/>
-          </p:nvSpPr>
-          <p:spPr>
-            <a:xfrm>
-              <a:off x="4437111" y="3445770"/>
-              <a:ext cx="1948397" cy="2060069"/>
-            </a:xfrm>
-            <a:prstGeom prst="rect">
-              <a:avLst/>
-            </a:prstGeom>
+          <a:prstGeom prst="rect">
+            <a:avLst/>
+          </a:prstGeom>
+          <a:solidFill>
+            <a:schemeClr val="accent3">
+              <a:lumMod val="20000"/>
+              <a:lumOff val="80000"/>
+            </a:schemeClr>
+          </a:solidFill>
+          <a:ln w="15875">
             <a:solidFill>
-              <a:schemeClr val="accent3">
-                <a:lumMod val="20000"/>
-                <a:lumOff val="80000"/>
-              </a:schemeClr>
+              <a:srgbClr val="FF0000"/>
             </a:solidFill>
-            <a:ln w="15875">
-              <a:solidFill>
-                <a:srgbClr val="FF0000"/>
-              </a:solidFill>
-            </a:ln>
-          </p:spPr>
-          <p:style>
-            <a:lnRef idx="2">
-              <a:schemeClr val="accent1">
-                <a:shade val="50000"/>
-              </a:schemeClr>
-            </a:lnRef>
-            <a:fillRef idx="1">
-              <a:schemeClr val="accent1"/>
-            </a:fillRef>
-            <a:effectRef idx="0">
-              <a:schemeClr val="accent1"/>
-            </a:effectRef>
-            <a:fontRef idx="minor">
-              <a:schemeClr val="lt1"/>
-            </a:fontRef>
-          </p:style>
-          <p:txBody>
-            <a:bodyPr rtlCol="0" anchor="ctr"/>
-            <a:lstStyle/>
-            <a:p>
-              <a:endParaRPr lang="en-US" dirty="0"/>
-            </a:p>
-          </p:txBody>
-        </p:sp>
-        <p:sp>
-          <p:nvSpPr>
-            <p:cNvPr id="27" name="TextBox 26"/>
-            <p:cNvSpPr txBox="1"/>
-            <p:nvPr/>
-          </p:nvSpPr>
-          <p:spPr>
-            <a:xfrm>
-              <a:off x="4437112" y="4644008"/>
-              <a:ext cx="1877791" cy="511249"/>
-            </a:xfrm>
-            <a:prstGeom prst="rect">
-              <a:avLst/>
-            </a:prstGeom>
-            <a:noFill/>
-          </p:spPr>
-          <p:txBody>
-            <a:bodyPr wrap="none" rtlCol="0">
-              <a:spAutoFit/>
-            </a:bodyPr>
-            <a:lstStyle/>
-            <a:p>
-              <a:r>
-                <a:rPr lang="en-US" sz="800" dirty="0" err="1" smtClean="0">
-                  <a:latin typeface="Arial" panose="020B0604020202020204" pitchFamily="34" charset="0"/>
-                  <a:cs typeface="Arial" panose="020B0604020202020204" pitchFamily="34" charset="0"/>
-                </a:rPr>
-                <a:t>CardType</a:t>
-              </a:r>
-              <a:r>
-                <a:rPr lang="en-US" sz="800" dirty="0" smtClean="0">
-                  <a:latin typeface="Arial" panose="020B0604020202020204" pitchFamily="34" charset="0"/>
-                  <a:cs typeface="Arial" panose="020B0604020202020204" pitchFamily="34" charset="0"/>
-                </a:rPr>
-                <a:t> (Selected)</a:t>
-              </a:r>
-              <a:br>
-                <a:rPr lang="en-US" sz="800" dirty="0" smtClean="0">
-                  <a:latin typeface="Arial" panose="020B0604020202020204" pitchFamily="34" charset="0"/>
-                  <a:cs typeface="Arial" panose="020B0604020202020204" pitchFamily="34" charset="0"/>
-                </a:rPr>
-              </a:br>
-              <a:r>
-                <a:rPr lang="en-US" sz="800" dirty="0" err="1" smtClean="0">
-                  <a:latin typeface="Arial" panose="020B0604020202020204" pitchFamily="34" charset="0"/>
-                  <a:cs typeface="Arial" panose="020B0604020202020204" pitchFamily="34" charset="0"/>
-                </a:rPr>
-                <a:t>PaymentToken</a:t>
-              </a:r>
-              <a:r>
-                <a:rPr lang="en-US" sz="800" dirty="0" smtClean="0">
-                  <a:latin typeface="Arial" panose="020B0604020202020204" pitchFamily="34" charset="0"/>
-                  <a:cs typeface="Arial" panose="020B0604020202020204" pitchFamily="34" charset="0"/>
-                </a:rPr>
-                <a:t> (</a:t>
-              </a:r>
-              <a:r>
-                <a:rPr lang="en-US" sz="800" i="1" dirty="0" smtClean="0">
-                  <a:latin typeface="Arial" panose="020B0604020202020204" pitchFamily="34" charset="0"/>
-                  <a:cs typeface="Arial" panose="020B0604020202020204" pitchFamily="34" charset="0"/>
-                </a:rPr>
-                <a:t>Tokenized</a:t>
-              </a:r>
-              <a:r>
-                <a:rPr lang="en-US" sz="800" dirty="0" smtClean="0">
-                  <a:latin typeface="Arial" panose="020B0604020202020204" pitchFamily="34" charset="0"/>
-                  <a:cs typeface="Arial" panose="020B0604020202020204" pitchFamily="34" charset="0"/>
-                </a:rPr>
-                <a:t> PAN)</a:t>
-              </a:r>
-            </a:p>
-            <a:p>
-              <a:r>
-                <a:rPr lang="en-US" sz="800" dirty="0" err="1" smtClean="0">
-                  <a:latin typeface="Arial" panose="020B0604020202020204" pitchFamily="34" charset="0"/>
-                  <a:cs typeface="Arial" panose="020B0604020202020204" pitchFamily="34" charset="0"/>
-                </a:rPr>
-                <a:t>ReferencePAN</a:t>
-              </a:r>
-              <a:r>
-                <a:rPr lang="en-US" sz="800" dirty="0" smtClean="0">
-                  <a:latin typeface="Arial" panose="020B0604020202020204" pitchFamily="34" charset="0"/>
-                  <a:cs typeface="Arial" panose="020B0604020202020204" pitchFamily="34" charset="0"/>
-                </a:rPr>
-                <a:t> (Last 4 digits of PAN)</a:t>
-              </a:r>
-              <a:br>
-                <a:rPr lang="en-US" sz="800" dirty="0" smtClean="0">
-                  <a:latin typeface="Arial" panose="020B0604020202020204" pitchFamily="34" charset="0"/>
-                  <a:cs typeface="Arial" panose="020B0604020202020204" pitchFamily="34" charset="0"/>
-                </a:rPr>
-              </a:br>
-              <a:r>
-                <a:rPr lang="en-US" sz="800" dirty="0" err="1" smtClean="0">
-                  <a:latin typeface="Arial" panose="020B0604020202020204" pitchFamily="34" charset="0"/>
-                  <a:cs typeface="Arial" panose="020B0604020202020204" pitchFamily="34" charset="0"/>
-                </a:rPr>
-                <a:t>TransactionID</a:t>
-              </a:r>
-              <a:r>
-                <a:rPr lang="en-US" sz="800" dirty="0" smtClean="0">
-                  <a:latin typeface="Arial" panose="020B0604020202020204" pitchFamily="34" charset="0"/>
-                  <a:cs typeface="Arial" panose="020B0604020202020204" pitchFamily="34" charset="0"/>
-                </a:rPr>
-                <a:t> </a:t>
-              </a:r>
-              <a:r>
-                <a:rPr lang="en-US" sz="800" dirty="0">
-                  <a:latin typeface="Arial" panose="020B0604020202020204" pitchFamily="34" charset="0"/>
-                  <a:cs typeface="Arial" panose="020B0604020202020204" pitchFamily="34" charset="0"/>
-                </a:rPr>
-                <a:t>(Payment Provider)</a:t>
-              </a:r>
-            </a:p>
-            <a:p>
-              <a:r>
-                <a:rPr lang="en-US" sz="800" dirty="0" err="1" smtClean="0">
-                  <a:latin typeface="Arial" panose="020B0604020202020204" pitchFamily="34" charset="0"/>
-                  <a:cs typeface="Arial" panose="020B0604020202020204" pitchFamily="34" charset="0"/>
-                </a:rPr>
-                <a:t>DateTime</a:t>
-              </a:r>
-              <a:r>
-                <a:rPr lang="en-US" sz="800" dirty="0" smtClean="0">
-                  <a:latin typeface="Arial" panose="020B0604020202020204" pitchFamily="34" charset="0"/>
-                  <a:cs typeface="Arial" panose="020B0604020202020204" pitchFamily="34" charset="0"/>
-                </a:rPr>
-                <a:t> (Payment Provider)</a:t>
-              </a:r>
-              <a:endParaRPr lang="en-US" sz="800" dirty="0">
-                <a:latin typeface="Arial" panose="020B0604020202020204" pitchFamily="34" charset="0"/>
-                <a:cs typeface="Arial" panose="020B0604020202020204" pitchFamily="34" charset="0"/>
-              </a:endParaRPr>
-            </a:p>
-            <a:p>
-              <a:pPr>
-                <a:spcBef>
-                  <a:spcPts val="600"/>
-                </a:spcBef>
-              </a:pPr>
-              <a:r>
-                <a:rPr lang="en-US" sz="800" b="1" dirty="0" smtClean="0">
-                  <a:latin typeface="Arial" panose="020B0604020202020204" pitchFamily="34" charset="0"/>
-                  <a:cs typeface="Arial" panose="020B0604020202020204" pitchFamily="34" charset="0"/>
-                </a:rPr>
-                <a:t>Signature</a:t>
-              </a:r>
-              <a:r>
-                <a:rPr lang="en-US" sz="800" dirty="0" smtClean="0">
-                  <a:latin typeface="Arial" panose="020B0604020202020204" pitchFamily="34" charset="0"/>
-                  <a:cs typeface="Arial" panose="020B0604020202020204" pitchFamily="34" charset="0"/>
-                </a:rPr>
-                <a:t> (Payment Provider)</a:t>
-              </a:r>
-              <a:endParaRPr lang="en-US" sz="800" dirty="0">
-                <a:latin typeface="Arial" panose="020B0604020202020204" pitchFamily="34" charset="0"/>
-                <a:cs typeface="Arial" panose="020B0604020202020204" pitchFamily="34" charset="0"/>
-              </a:endParaRPr>
-            </a:p>
-          </p:txBody>
-        </p:sp>
-        <p:grpSp>
-          <p:nvGrpSpPr>
-            <p:cNvPr id="28" name="Group 27"/>
-            <p:cNvGrpSpPr/>
-            <p:nvPr/>
-          </p:nvGrpSpPr>
-          <p:grpSpPr>
-            <a:xfrm>
-              <a:off x="4545124" y="3707904"/>
-              <a:ext cx="1281652" cy="907941"/>
-              <a:chOff x="1988840" y="1331640"/>
-              <a:chExt cx="1281652" cy="907941"/>
-            </a:xfrm>
-          </p:grpSpPr>
-          <p:sp>
-            <p:nvSpPr>
-              <p:cNvPr id="30" name="Rectangle 29"/>
-              <p:cNvSpPr/>
-              <p:nvPr/>
-            </p:nvSpPr>
-            <p:spPr>
-              <a:xfrm>
-                <a:off x="1988840" y="1331641"/>
-                <a:ext cx="1281652" cy="907940"/>
-              </a:xfrm>
-              <a:prstGeom prst="rect">
-                <a:avLst/>
-              </a:prstGeom>
-              <a:solidFill>
-                <a:srgbClr val="FEFEDE"/>
-              </a:solidFill>
-              <a:ln w="15875">
-                <a:solidFill>
-                  <a:srgbClr val="FF0000"/>
-                </a:solidFill>
-              </a:ln>
-            </p:spPr>
-            <p:style>
-              <a:lnRef idx="2">
-                <a:schemeClr val="accent1">
-                  <a:shade val="50000"/>
-                </a:schemeClr>
-              </a:lnRef>
-              <a:fillRef idx="1">
-                <a:schemeClr val="accent1"/>
-              </a:fillRef>
-              <a:effectRef idx="0">
-                <a:schemeClr val="accent1"/>
-              </a:effectRef>
-              <a:fontRef idx="minor">
-                <a:schemeClr val="lt1"/>
-              </a:fontRef>
-            </p:style>
-            <p:txBody>
-              <a:bodyPr rtlCol="0" anchor="ctr"/>
-              <a:lstStyle/>
-              <a:p>
-                <a:endParaRPr lang="en-US" dirty="0"/>
-              </a:p>
-            </p:txBody>
-          </p:sp>
-          <p:sp>
-            <p:nvSpPr>
-              <p:cNvPr id="31" name="TextBox 30"/>
-              <p:cNvSpPr txBox="1"/>
-              <p:nvPr/>
-            </p:nvSpPr>
-            <p:spPr>
-              <a:xfrm>
-                <a:off x="1988840" y="1331640"/>
-                <a:ext cx="1154082" cy="511249"/>
-              </a:xfrm>
-              <a:prstGeom prst="rect">
-                <a:avLst/>
-              </a:prstGeom>
-              <a:noFill/>
-              <a:ln w="19050">
-                <a:noFill/>
-              </a:ln>
-            </p:spPr>
-            <p:txBody>
-              <a:bodyPr wrap="none" rtlCol="0">
-                <a:spAutoFit/>
-              </a:bodyPr>
-              <a:lstStyle/>
-              <a:p>
-                <a:r>
-                  <a:rPr lang="en-US" sz="800" dirty="0" err="1" smtClean="0">
-                    <a:latin typeface="Arial" panose="020B0604020202020204" pitchFamily="34" charset="0"/>
-                    <a:cs typeface="Arial" panose="020B0604020202020204" pitchFamily="34" charset="0"/>
-                  </a:rPr>
-                  <a:t>CommonName</a:t>
-                </a:r>
-                <a:r>
-                  <a:rPr lang="en-US" sz="800" dirty="0" smtClean="0">
-                    <a:latin typeface="Arial" panose="020B0604020202020204" pitchFamily="34" charset="0"/>
-                    <a:cs typeface="Arial" panose="020B0604020202020204" pitchFamily="34" charset="0"/>
-                  </a:rPr>
-                  <a:t/>
-                </a:r>
-                <a:br>
-                  <a:rPr lang="en-US" sz="800" dirty="0" smtClean="0">
-                    <a:latin typeface="Arial" panose="020B0604020202020204" pitchFamily="34" charset="0"/>
-                    <a:cs typeface="Arial" panose="020B0604020202020204" pitchFamily="34" charset="0"/>
-                  </a:rPr>
-                </a:br>
-                <a:r>
-                  <a:rPr lang="en-US" sz="800" dirty="0" smtClean="0">
-                    <a:latin typeface="Arial" panose="020B0604020202020204" pitchFamily="34" charset="0"/>
-                    <a:cs typeface="Arial" panose="020B0604020202020204" pitchFamily="34" charset="0"/>
-                  </a:rPr>
-                  <a:t>Amount</a:t>
-                </a:r>
-                <a:br>
-                  <a:rPr lang="en-US" sz="800" dirty="0" smtClean="0">
-                    <a:latin typeface="Arial" panose="020B0604020202020204" pitchFamily="34" charset="0"/>
-                    <a:cs typeface="Arial" panose="020B0604020202020204" pitchFamily="34" charset="0"/>
-                  </a:rPr>
-                </a:br>
-                <a:r>
-                  <a:rPr lang="en-US" sz="800" dirty="0" smtClean="0">
-                    <a:latin typeface="Arial" panose="020B0604020202020204" pitchFamily="34" charset="0"/>
-                    <a:cs typeface="Arial" panose="020B0604020202020204" pitchFamily="34" charset="0"/>
-                  </a:rPr>
-                  <a:t>Currency</a:t>
-                </a:r>
-                <a:br>
-                  <a:rPr lang="en-US" sz="800" dirty="0" smtClean="0">
-                    <a:latin typeface="Arial" panose="020B0604020202020204" pitchFamily="34" charset="0"/>
-                    <a:cs typeface="Arial" panose="020B0604020202020204" pitchFamily="34" charset="0"/>
-                  </a:rPr>
-                </a:br>
-                <a:r>
-                  <a:rPr lang="en-US" sz="800" dirty="0" err="1">
-                    <a:latin typeface="Arial" panose="020B0604020202020204" pitchFamily="34" charset="0"/>
-                    <a:cs typeface="Arial" panose="020B0604020202020204" pitchFamily="34" charset="0"/>
-                  </a:rPr>
-                  <a:t>ReferenceID</a:t>
-                </a:r>
-                <a:r>
-                  <a:rPr lang="en-US" sz="800" dirty="0">
-                    <a:latin typeface="Arial" panose="020B0604020202020204" pitchFamily="34" charset="0"/>
-                    <a:cs typeface="Arial" panose="020B0604020202020204" pitchFamily="34" charset="0"/>
-                  </a:rPr>
-                  <a:t> (</a:t>
-                </a:r>
-                <a:r>
-                  <a:rPr lang="en-US" sz="800" dirty="0" smtClean="0">
-                    <a:latin typeface="Arial" panose="020B0604020202020204" pitchFamily="34" charset="0"/>
-                    <a:cs typeface="Arial" panose="020B0604020202020204" pitchFamily="34" charset="0"/>
-                  </a:rPr>
-                  <a:t>Payee)</a:t>
-                </a:r>
-              </a:p>
-              <a:p>
-                <a:r>
-                  <a:rPr lang="en-US" sz="800" dirty="0" err="1" smtClean="0">
-                    <a:latin typeface="Arial" panose="020B0604020202020204" pitchFamily="34" charset="0"/>
-                    <a:cs typeface="Arial" panose="020B0604020202020204" pitchFamily="34" charset="0"/>
-                  </a:rPr>
-                  <a:t>DateTime</a:t>
-                </a:r>
-                <a:r>
-                  <a:rPr lang="en-US" sz="800" dirty="0" smtClean="0">
-                    <a:latin typeface="Arial" panose="020B0604020202020204" pitchFamily="34" charset="0"/>
-                    <a:cs typeface="Arial" panose="020B0604020202020204" pitchFamily="34" charset="0"/>
-                  </a:rPr>
-                  <a:t> (Payee)</a:t>
-                </a:r>
-                <a:endParaRPr lang="en-US" sz="800" dirty="0">
-                  <a:latin typeface="Arial" panose="020B0604020202020204" pitchFamily="34" charset="0"/>
-                  <a:cs typeface="Arial" panose="020B0604020202020204" pitchFamily="34" charset="0"/>
-                </a:endParaRPr>
-              </a:p>
-              <a:p>
-                <a:pPr>
-                  <a:spcBef>
-                    <a:spcPts val="600"/>
-                  </a:spcBef>
-                </a:pPr>
-                <a:r>
-                  <a:rPr lang="en-US" sz="800" b="1" dirty="0" smtClean="0">
-                    <a:latin typeface="Arial" panose="020B0604020202020204" pitchFamily="34" charset="0"/>
-                    <a:cs typeface="Arial" panose="020B0604020202020204" pitchFamily="34" charset="0"/>
-                  </a:rPr>
-                  <a:t>Signature</a:t>
-                </a:r>
-                <a:r>
-                  <a:rPr lang="en-US" sz="800" dirty="0" smtClean="0">
-                    <a:latin typeface="Arial" panose="020B0604020202020204" pitchFamily="34" charset="0"/>
-                    <a:cs typeface="Arial" panose="020B0604020202020204" pitchFamily="34" charset="0"/>
-                  </a:rPr>
-                  <a:t> (Payee)</a:t>
-                </a:r>
-                <a:endParaRPr lang="en-US" sz="800" dirty="0">
-                  <a:latin typeface="Arial" panose="020B0604020202020204" pitchFamily="34" charset="0"/>
-                  <a:cs typeface="Arial" panose="020B0604020202020204" pitchFamily="34" charset="0"/>
-                </a:endParaRPr>
-              </a:p>
-            </p:txBody>
-          </p:sp>
-        </p:grpSp>
-        <p:sp>
-          <p:nvSpPr>
-            <p:cNvPr id="29" name="TextBox 28"/>
-            <p:cNvSpPr txBox="1"/>
-            <p:nvPr/>
-          </p:nvSpPr>
-          <p:spPr>
-            <a:xfrm>
-              <a:off x="4437112" y="3491880"/>
-              <a:ext cx="1006452" cy="121314"/>
-            </a:xfrm>
-            <a:prstGeom prst="rect">
-              <a:avLst/>
-            </a:prstGeom>
-            <a:noFill/>
-          </p:spPr>
-          <p:txBody>
-            <a:bodyPr wrap="none" rtlCol="0">
-              <a:spAutoFit/>
-            </a:bodyPr>
-            <a:lstStyle/>
-            <a:p>
-              <a:r>
-                <a:rPr lang="en-US" sz="800" dirty="0" err="1" smtClean="0">
-                  <a:latin typeface="Arial" panose="020B0604020202020204" pitchFamily="34" charset="0"/>
-                  <a:cs typeface="Arial" panose="020B0604020202020204" pitchFamily="34" charset="0"/>
-                </a:rPr>
-                <a:t>PaymentRequest</a:t>
-              </a:r>
-              <a:r>
-                <a:rPr lang="en-US" sz="800" dirty="0" smtClean="0">
-                  <a:latin typeface="Arial" panose="020B0604020202020204" pitchFamily="34" charset="0"/>
-                  <a:cs typeface="Arial" panose="020B0604020202020204" pitchFamily="34" charset="0"/>
-                </a:rPr>
-                <a:t>:</a:t>
-              </a:r>
-              <a:endParaRPr lang="en-US" sz="800" dirty="0">
-                <a:latin typeface="Arial" panose="020B0604020202020204" pitchFamily="34" charset="0"/>
-                <a:cs typeface="Arial" panose="020B0604020202020204" pitchFamily="34" charset="0"/>
-              </a:endParaRPr>
-            </a:p>
-          </p:txBody>
-        </p:sp>
-      </p:grpSp>
+          </a:ln>
+        </p:spPr>
+        <p:style>
+          <a:lnRef idx="2">
+            <a:schemeClr val="accent1">
+              <a:shade val="50000"/>
+            </a:schemeClr>
+          </a:lnRef>
+          <a:fillRef idx="1">
+            <a:schemeClr val="accent1"/>
+          </a:fillRef>
+          <a:effectRef idx="0">
+            <a:schemeClr val="accent1"/>
+          </a:effectRef>
+          <a:fontRef idx="minor">
+            <a:schemeClr val="lt1"/>
+          </a:fontRef>
+        </p:style>
+        <p:txBody>
+          <a:bodyPr rtlCol="0" anchor="ctr"/>
+          <a:lstStyle/>
+          <a:p>
+            <a:endParaRPr lang="en-US" dirty="0"/>
+          </a:p>
+        </p:txBody>
+      </p:sp>
+      <p:sp>
+        <p:nvSpPr>
+          <p:cNvPr id="27" name="TextBox 26"/>
+          <p:cNvSpPr txBox="1"/>
+          <p:nvPr/>
+        </p:nvSpPr>
+        <p:spPr>
+          <a:xfrm>
+            <a:off x="6578083" y="10503567"/>
+            <a:ext cx="1887055" cy="1115690"/>
+          </a:xfrm>
+          <a:prstGeom prst="rect">
+            <a:avLst/>
+          </a:prstGeom>
+          <a:noFill/>
+        </p:spPr>
+        <p:txBody>
+          <a:bodyPr wrap="none" rtlCol="0">
+            <a:spAutoFit/>
+          </a:bodyPr>
+          <a:lstStyle/>
+          <a:p>
+            <a:r>
+              <a:rPr lang="en-US" sz="800" dirty="0" err="1" smtClean="0">
+                <a:latin typeface="Arial" panose="020B0604020202020204" pitchFamily="34" charset="0"/>
+                <a:cs typeface="Arial" panose="020B0604020202020204" pitchFamily="34" charset="0"/>
+              </a:rPr>
+              <a:t>CardType</a:t>
+            </a:r>
+            <a:r>
+              <a:rPr lang="en-US" sz="800" dirty="0" smtClean="0">
+                <a:latin typeface="Arial" panose="020B0604020202020204" pitchFamily="34" charset="0"/>
+                <a:cs typeface="Arial" panose="020B0604020202020204" pitchFamily="34" charset="0"/>
+              </a:rPr>
+              <a:t> (Selected)</a:t>
+            </a:r>
+            <a:br>
+              <a:rPr lang="en-US" sz="800" dirty="0" smtClean="0">
+                <a:latin typeface="Arial" panose="020B0604020202020204" pitchFamily="34" charset="0"/>
+                <a:cs typeface="Arial" panose="020B0604020202020204" pitchFamily="34" charset="0"/>
+              </a:rPr>
+            </a:br>
+            <a:r>
+              <a:rPr lang="en-US" sz="800" dirty="0" err="1" smtClean="0">
+                <a:latin typeface="Arial" panose="020B0604020202020204" pitchFamily="34" charset="0"/>
+                <a:cs typeface="Arial" panose="020B0604020202020204" pitchFamily="34" charset="0"/>
+              </a:rPr>
+              <a:t>CardReference</a:t>
+            </a:r>
+            <a:r>
+              <a:rPr lang="en-US" sz="800" dirty="0" smtClean="0">
+                <a:latin typeface="Arial" panose="020B0604020202020204" pitchFamily="34" charset="0"/>
+                <a:cs typeface="Arial" panose="020B0604020202020204" pitchFamily="34" charset="0"/>
+              </a:rPr>
+              <a:t> (Last </a:t>
+            </a:r>
+            <a:r>
+              <a:rPr lang="en-US" sz="800" dirty="0" smtClean="0">
+                <a:latin typeface="Arial" panose="020B0604020202020204" pitchFamily="34" charset="0"/>
+                <a:cs typeface="Arial" panose="020B0604020202020204" pitchFamily="34" charset="0"/>
+              </a:rPr>
+              <a:t>4 digits of PAN</a:t>
+            </a:r>
+            <a:r>
+              <a:rPr lang="en-US" sz="800" dirty="0" smtClean="0">
+                <a:latin typeface="Arial" panose="020B0604020202020204" pitchFamily="34" charset="0"/>
+                <a:cs typeface="Arial" panose="020B0604020202020204" pitchFamily="34" charset="0"/>
+              </a:rPr>
+              <a:t>)</a:t>
+            </a:r>
+          </a:p>
+          <a:p>
+            <a:r>
+              <a:rPr lang="en-US" sz="800" dirty="0" err="1">
+                <a:latin typeface="Arial" panose="020B0604020202020204" pitchFamily="34" charset="0"/>
+                <a:cs typeface="Arial" panose="020B0604020202020204" pitchFamily="34" charset="0"/>
+              </a:rPr>
+              <a:t>PaymentToken</a:t>
+            </a:r>
+            <a:r>
+              <a:rPr lang="en-US" sz="800" dirty="0">
+                <a:latin typeface="Arial" panose="020B0604020202020204" pitchFamily="34" charset="0"/>
+                <a:cs typeface="Arial" panose="020B0604020202020204" pitchFamily="34" charset="0"/>
+              </a:rPr>
+              <a:t> (</a:t>
+            </a:r>
+            <a:r>
+              <a:rPr lang="en-US" sz="800" i="1" dirty="0">
+                <a:latin typeface="Arial" panose="020B0604020202020204" pitchFamily="34" charset="0"/>
+                <a:cs typeface="Arial" panose="020B0604020202020204" pitchFamily="34" charset="0"/>
+              </a:rPr>
+              <a:t>Tokenized</a:t>
+            </a:r>
+            <a:r>
+              <a:rPr lang="en-US" sz="800" dirty="0">
+                <a:latin typeface="Arial" panose="020B0604020202020204" pitchFamily="34" charset="0"/>
+                <a:cs typeface="Arial" panose="020B0604020202020204" pitchFamily="34" charset="0"/>
+              </a:rPr>
+              <a:t> PAN)</a:t>
+            </a:r>
+          </a:p>
+          <a:p>
+            <a:r>
+              <a:rPr lang="en-US" sz="800" dirty="0" err="1" smtClean="0">
+                <a:latin typeface="Arial" panose="020B0604020202020204" pitchFamily="34" charset="0"/>
+                <a:cs typeface="Arial" panose="020B0604020202020204" pitchFamily="34" charset="0"/>
+              </a:rPr>
+              <a:t>Reference</a:t>
+            </a:r>
+            <a:r>
+              <a:rPr lang="en-US" sz="800" dirty="0" err="1" smtClean="0">
+                <a:latin typeface="Arial" panose="020B0604020202020204" pitchFamily="34" charset="0"/>
+                <a:cs typeface="Arial" panose="020B0604020202020204" pitchFamily="34" charset="0"/>
+              </a:rPr>
+              <a:t>ID</a:t>
+            </a:r>
+            <a:r>
+              <a:rPr lang="en-US" sz="800" dirty="0" smtClean="0">
+                <a:latin typeface="Arial" panose="020B0604020202020204" pitchFamily="34" charset="0"/>
+                <a:cs typeface="Arial" panose="020B0604020202020204" pitchFamily="34" charset="0"/>
+              </a:rPr>
+              <a:t> </a:t>
+            </a:r>
+            <a:r>
+              <a:rPr lang="en-US" sz="800" dirty="0">
+                <a:latin typeface="Arial" panose="020B0604020202020204" pitchFamily="34" charset="0"/>
+                <a:cs typeface="Arial" panose="020B0604020202020204" pitchFamily="34" charset="0"/>
+              </a:rPr>
+              <a:t>(Payment Provider</a:t>
+            </a:r>
+            <a:r>
+              <a:rPr lang="en-US" sz="800" dirty="0" smtClean="0">
+                <a:latin typeface="Arial" panose="020B0604020202020204" pitchFamily="34" charset="0"/>
+                <a:cs typeface="Arial" panose="020B0604020202020204" pitchFamily="34" charset="0"/>
+              </a:rPr>
+              <a:t>)</a:t>
+            </a:r>
+          </a:p>
+          <a:p>
+            <a:r>
+              <a:rPr lang="en-US" sz="800" dirty="0" err="1" smtClean="0">
+                <a:latin typeface="Arial" panose="020B0604020202020204" pitchFamily="34" charset="0"/>
+                <a:cs typeface="Arial" panose="020B0604020202020204" pitchFamily="34" charset="0"/>
+              </a:rPr>
+              <a:t>SoftwareID</a:t>
+            </a:r>
+            <a:endParaRPr lang="en-US" sz="800" dirty="0" smtClean="0">
+              <a:latin typeface="Arial" panose="020B0604020202020204" pitchFamily="34" charset="0"/>
+              <a:cs typeface="Arial" panose="020B0604020202020204" pitchFamily="34" charset="0"/>
+            </a:endParaRPr>
+          </a:p>
+          <a:p>
+            <a:r>
+              <a:rPr lang="en-US" sz="800" dirty="0" err="1" smtClean="0">
+                <a:latin typeface="Arial" panose="020B0604020202020204" pitchFamily="34" charset="0"/>
+                <a:cs typeface="Arial" panose="020B0604020202020204" pitchFamily="34" charset="0"/>
+              </a:rPr>
+              <a:t>SoftwareVersion</a:t>
+            </a:r>
+            <a:endParaRPr lang="en-US" sz="800" dirty="0">
+              <a:latin typeface="Arial" panose="020B0604020202020204" pitchFamily="34" charset="0"/>
+              <a:cs typeface="Arial" panose="020B0604020202020204" pitchFamily="34" charset="0"/>
+            </a:endParaRPr>
+          </a:p>
+          <a:p>
+            <a:r>
+              <a:rPr lang="en-US" sz="800" dirty="0" err="1" smtClean="0">
+                <a:latin typeface="Arial" panose="020B0604020202020204" pitchFamily="34" charset="0"/>
+                <a:cs typeface="Arial" panose="020B0604020202020204" pitchFamily="34" charset="0"/>
+              </a:rPr>
+              <a:t>DateTime</a:t>
+            </a:r>
+            <a:r>
+              <a:rPr lang="en-US" sz="800" dirty="0" smtClean="0">
+                <a:latin typeface="Arial" panose="020B0604020202020204" pitchFamily="34" charset="0"/>
+                <a:cs typeface="Arial" panose="020B0604020202020204" pitchFamily="34" charset="0"/>
+              </a:rPr>
+              <a:t> (Payment Provider)</a:t>
+            </a:r>
+            <a:endParaRPr lang="en-US" sz="800" dirty="0">
+              <a:latin typeface="Arial" panose="020B0604020202020204" pitchFamily="34" charset="0"/>
+              <a:cs typeface="Arial" panose="020B0604020202020204" pitchFamily="34" charset="0"/>
+            </a:endParaRPr>
+          </a:p>
+          <a:p>
+            <a:pPr>
+              <a:spcBef>
+                <a:spcPts val="300"/>
+              </a:spcBef>
+            </a:pPr>
+            <a:r>
+              <a:rPr lang="en-US" sz="800" b="1" dirty="0" smtClean="0">
+                <a:latin typeface="Arial" panose="020B0604020202020204" pitchFamily="34" charset="0"/>
+                <a:cs typeface="Arial" panose="020B0604020202020204" pitchFamily="34" charset="0"/>
+              </a:rPr>
+              <a:t>Signature</a:t>
+            </a:r>
+            <a:r>
+              <a:rPr lang="en-US" sz="800" dirty="0" smtClean="0">
+                <a:latin typeface="Arial" panose="020B0604020202020204" pitchFamily="34" charset="0"/>
+                <a:cs typeface="Arial" panose="020B0604020202020204" pitchFamily="34" charset="0"/>
+              </a:rPr>
+              <a:t> (Payment Provider)</a:t>
+            </a:r>
+            <a:endParaRPr lang="en-US" sz="800" dirty="0">
+              <a:latin typeface="Arial" panose="020B0604020202020204" pitchFamily="34" charset="0"/>
+              <a:cs typeface="Arial" panose="020B0604020202020204" pitchFamily="34" charset="0"/>
+            </a:endParaRPr>
+          </a:p>
+        </p:txBody>
+      </p:sp>
+      <p:sp>
+        <p:nvSpPr>
+          <p:cNvPr id="29" name="TextBox 28"/>
+          <p:cNvSpPr txBox="1"/>
+          <p:nvPr/>
+        </p:nvSpPr>
+        <p:spPr>
+          <a:xfrm>
+            <a:off x="6580337" y="9060934"/>
+            <a:ext cx="1005403" cy="134463"/>
+          </a:xfrm>
+          <a:prstGeom prst="rect">
+            <a:avLst/>
+          </a:prstGeom>
+          <a:noFill/>
+        </p:spPr>
+        <p:txBody>
+          <a:bodyPr wrap="none" rtlCol="0">
+            <a:spAutoFit/>
+          </a:bodyPr>
+          <a:lstStyle/>
+          <a:p>
+            <a:r>
+              <a:rPr lang="en-US" sz="800" dirty="0" err="1" smtClean="0">
+                <a:latin typeface="Arial" panose="020B0604020202020204" pitchFamily="34" charset="0"/>
+                <a:cs typeface="Arial" panose="020B0604020202020204" pitchFamily="34" charset="0"/>
+              </a:rPr>
+              <a:t>PaymentRequest</a:t>
+            </a:r>
+            <a:r>
+              <a:rPr lang="en-US" sz="800" dirty="0" smtClean="0">
+                <a:latin typeface="Arial" panose="020B0604020202020204" pitchFamily="34" charset="0"/>
+                <a:cs typeface="Arial" panose="020B0604020202020204" pitchFamily="34" charset="0"/>
+              </a:rPr>
+              <a:t>:</a:t>
+            </a:r>
+            <a:endParaRPr lang="en-US" sz="800" dirty="0">
+              <a:latin typeface="Arial" panose="020B0604020202020204" pitchFamily="34" charset="0"/>
+              <a:cs typeface="Arial" panose="020B0604020202020204" pitchFamily="34" charset="0"/>
+            </a:endParaRPr>
+          </a:p>
+        </p:txBody>
+      </p:sp>
       <p:sp>
         <p:nvSpPr>
           <p:cNvPr id="111" name="TextBox 110"/>
@@ -13378,7 +13222,7 @@
         </p:nvSpPr>
         <p:spPr>
           <a:xfrm>
-            <a:off x="2446184" y="9988618"/>
+            <a:off x="2446184" y="9906074"/>
             <a:ext cx="2538940" cy="276999"/>
           </a:xfrm>
           <a:prstGeom prst="rect">
@@ -13609,7 +13453,7 @@
         </p:nvCxnSpPr>
         <p:spPr>
           <a:xfrm>
-            <a:off x="3513567" y="9041978"/>
+            <a:off x="3513567" y="8774276"/>
             <a:ext cx="4666128" cy="0"/>
           </a:xfrm>
           <a:prstGeom prst="straightConnector1">
@@ -13639,16 +13483,16 @@
       </p:cxnSp>
       <p:grpSp>
         <p:nvGrpSpPr>
-          <p:cNvPr id="4" name="Group 3"/>
+          <p:cNvPr id="3" name="Group 2"/>
           <p:cNvGrpSpPr/>
           <p:nvPr/>
         </p:nvGrpSpPr>
         <p:grpSpPr>
           <a:xfrm>
-            <a:off x="2136415" y="8753946"/>
-            <a:ext cx="2168417" cy="1059605"/>
-            <a:chOff x="2257308" y="4287470"/>
-            <a:chExt cx="2242684" cy="914793"/>
+            <a:off x="2136415" y="8539080"/>
+            <a:ext cx="2168417" cy="1145889"/>
+            <a:chOff x="2136415" y="8753947"/>
+            <a:chExt cx="2168417" cy="1170844"/>
           </a:xfrm>
         </p:grpSpPr>
         <p:sp>
@@ -13659,8 +13503,8 @@
           </p:nvSpPr>
           <p:spPr>
             <a:xfrm>
-              <a:off x="2267744" y="4287470"/>
-              <a:ext cx="2232248" cy="914793"/>
+              <a:off x="2146505" y="8753947"/>
+              <a:ext cx="2158327" cy="1170844"/>
             </a:xfrm>
             <a:prstGeom prst="rect">
               <a:avLst/>
@@ -13716,8 +13560,8 @@
           </p:nvSpPr>
           <p:spPr>
             <a:xfrm>
-              <a:off x="2257308" y="4294464"/>
-              <a:ext cx="2153950" cy="511249"/>
+              <a:off x="2136415" y="8762048"/>
+              <a:ext cx="2090637" cy="1154162"/>
             </a:xfrm>
             <a:prstGeom prst="rect">
               <a:avLst/>
@@ -13731,6 +13575,26 @@
             <a:lstStyle/>
             <a:p>
               <a:r>
+                <a:rPr lang="en-US" sz="800" dirty="0" err="1">
+                  <a:latin typeface="Arial" panose="020B0604020202020204" pitchFamily="34" charset="0"/>
+                  <a:cs typeface="Arial" panose="020B0604020202020204" pitchFamily="34" charset="0"/>
+                </a:rPr>
+                <a:t>AuthData</a:t>
+              </a:r>
+              <a:r>
+                <a:rPr lang="en-US" sz="800" dirty="0">
+                  <a:latin typeface="Arial" panose="020B0604020202020204" pitchFamily="34" charset="0"/>
+                  <a:cs typeface="Arial" panose="020B0604020202020204" pitchFamily="34" charset="0"/>
+                </a:rPr>
+                <a:t> (Encrypted authorized request) </a:t>
+              </a:r>
+              <a:endParaRPr lang="en-US" sz="800" dirty="0" smtClean="0">
+                <a:latin typeface="Arial" panose="020B0604020202020204" pitchFamily="34" charset="0"/>
+                <a:cs typeface="Arial" panose="020B0604020202020204" pitchFamily="34" charset="0"/>
+              </a:endParaRPr>
+            </a:p>
+            <a:p>
+              <a:r>
                 <a:rPr lang="en-US" sz="800" dirty="0" err="1" smtClean="0">
                   <a:latin typeface="Arial" panose="020B0604020202020204" pitchFamily="34" charset="0"/>
                   <a:cs typeface="Arial" panose="020B0604020202020204" pitchFamily="34" charset="0"/>
@@ -13742,7 +13606,14 @@
                   <a:latin typeface="Arial" panose="020B0604020202020204" pitchFamily="34" charset="0"/>
                   <a:cs typeface="Arial" panose="020B0604020202020204" pitchFamily="34" charset="0"/>
                 </a:rPr>
-                <a:t> (Of original signed </a:t>
+                <a:t> </a:t>
+              </a:r>
+              <a:r>
+                <a:rPr lang="en-US" sz="800" dirty="0" smtClean="0">
+                  <a:latin typeface="Arial" panose="020B0604020202020204" pitchFamily="34" charset="0"/>
+                  <a:cs typeface="Arial" panose="020B0604020202020204" pitchFamily="34" charset="0"/>
+                </a:rPr>
+                <a:t>(Of original signed </a:t>
               </a:r>
               <a:r>
                 <a:rPr lang="en-US" sz="800" dirty="0">
@@ -13761,22 +13632,6 @@
             </a:p>
             <a:p>
               <a:r>
-                <a:rPr lang="en-US" sz="800" dirty="0" err="1">
-                  <a:latin typeface="Arial" panose="020B0604020202020204" pitchFamily="34" charset="0"/>
-                  <a:cs typeface="Arial" panose="020B0604020202020204" pitchFamily="34" charset="0"/>
-                </a:rPr>
-                <a:t>AuthData</a:t>
-              </a:r>
-              <a:r>
-                <a:rPr lang="en-US" sz="800" dirty="0">
-                  <a:latin typeface="Arial" panose="020B0604020202020204" pitchFamily="34" charset="0"/>
-                  <a:cs typeface="Arial" panose="020B0604020202020204" pitchFamily="34" charset="0"/>
-                </a:rPr>
-                <a:t> (Encrypted authorized request)</a:t>
-              </a:r>
-            </a:p>
-            <a:p>
-              <a:r>
                 <a:rPr lang="en-US" sz="800" dirty="0" err="1" smtClean="0">
                   <a:latin typeface="Arial" panose="020B0604020202020204" pitchFamily="34" charset="0"/>
                   <a:cs typeface="Arial" panose="020B0604020202020204" pitchFamily="34" charset="0"/>
@@ -13788,7 +13643,14 @@
                   <a:latin typeface="Arial" panose="020B0604020202020204" pitchFamily="34" charset="0"/>
                   <a:cs typeface="Arial" panose="020B0604020202020204" pitchFamily="34" charset="0"/>
                 </a:rPr>
-                <a:t> (</a:t>
+                <a:t> </a:t>
+              </a:r>
+              <a:r>
+                <a:rPr lang="en-US" sz="800" dirty="0" smtClean="0">
+                  <a:latin typeface="Arial" panose="020B0604020202020204" pitchFamily="34" charset="0"/>
+                  <a:cs typeface="Arial" panose="020B0604020202020204" pitchFamily="34" charset="0"/>
+                </a:rPr>
+                <a:t>(</a:t>
               </a:r>
               <a:r>
                 <a:rPr lang="en-US" sz="800" dirty="0">
@@ -13811,7 +13673,14 @@
                   <a:latin typeface="Arial" panose="020B0604020202020204" pitchFamily="34" charset="0"/>
                   <a:cs typeface="Arial" panose="020B0604020202020204" pitchFamily="34" charset="0"/>
                 </a:rPr>
-                <a:t>TransactionID</a:t>
+                <a:t>Reference</a:t>
+              </a:r>
+              <a:r>
+                <a:rPr lang="en-US" sz="800" dirty="0" err="1" smtClean="0">
+                  <a:latin typeface="Arial" panose="020B0604020202020204" pitchFamily="34" charset="0"/>
+                  <a:cs typeface="Arial" panose="020B0604020202020204" pitchFamily="34" charset="0"/>
+                </a:rPr>
+                <a:t>ID</a:t>
               </a:r>
               <a:r>
                 <a:rPr lang="en-US" sz="800" dirty="0" smtClean="0">
@@ -13825,8 +13694,41 @@
                   <a:latin typeface="Arial" panose="020B0604020202020204" pitchFamily="34" charset="0"/>
                   <a:cs typeface="Arial" panose="020B0604020202020204" pitchFamily="34" charset="0"/>
                 </a:rPr>
-                <a:t>(Payee)</a:t>
+                <a:t>(</a:t>
               </a:r>
+              <a:r>
+                <a:rPr lang="en-US" sz="800" dirty="0" smtClean="0">
+                  <a:latin typeface="Arial" panose="020B0604020202020204" pitchFamily="34" charset="0"/>
+                  <a:cs typeface="Arial" panose="020B0604020202020204" pitchFamily="34" charset="0"/>
+                </a:rPr>
+                <a:t>Payee copy )</a:t>
+              </a:r>
+            </a:p>
+            <a:p>
+              <a:r>
+                <a:rPr lang="en-US" sz="800" dirty="0" err="1" smtClean="0">
+                  <a:latin typeface="Arial" panose="020B0604020202020204" pitchFamily="34" charset="0"/>
+                  <a:cs typeface="Arial" panose="020B0604020202020204" pitchFamily="34" charset="0"/>
+                </a:rPr>
+                <a:t>SoftwareID</a:t>
+              </a:r>
+              <a:endParaRPr lang="en-US" sz="800" dirty="0" smtClean="0">
+                <a:latin typeface="Arial" panose="020B0604020202020204" pitchFamily="34" charset="0"/>
+                <a:cs typeface="Arial" panose="020B0604020202020204" pitchFamily="34" charset="0"/>
+              </a:endParaRPr>
+            </a:p>
+            <a:p>
+              <a:r>
+                <a:rPr lang="en-US" sz="800" dirty="0" err="1" smtClean="0">
+                  <a:latin typeface="Arial" panose="020B0604020202020204" pitchFamily="34" charset="0"/>
+                  <a:cs typeface="Arial" panose="020B0604020202020204" pitchFamily="34" charset="0"/>
+                </a:rPr>
+                <a:t>SoftwareVersion</a:t>
+              </a:r>
+              <a:endParaRPr lang="en-US" sz="800" dirty="0">
+                <a:latin typeface="Arial" panose="020B0604020202020204" pitchFamily="34" charset="0"/>
+                <a:cs typeface="Arial" panose="020B0604020202020204" pitchFamily="34" charset="0"/>
+              </a:endParaRPr>
             </a:p>
             <a:p>
               <a:r>
@@ -13854,7 +13756,7 @@
             <a:p>
               <a:pPr>
                 <a:spcBef>
-                  <a:spcPts val="600"/>
+                  <a:spcPts val="300"/>
                 </a:spcBef>
               </a:pPr>
               <a:r>
@@ -13887,7 +13789,7 @@
         </p:nvSpPr>
         <p:spPr>
           <a:xfrm>
-            <a:off x="1429670" y="8071777"/>
+            <a:off x="1429670" y="7998324"/>
             <a:ext cx="1494975" cy="246221"/>
           </a:xfrm>
           <a:prstGeom prst="rect">
@@ -14006,52 +13908,8 @@
         </p:nvSpPr>
         <p:spPr>
           <a:xfrm>
-            <a:off x="4923945" y="1732950"/>
+            <a:off x="4921563" y="1744860"/>
             <a:ext cx="108000" cy="108000"/>
-          </a:xfrm>
-          <a:prstGeom prst="ellipse">
-            <a:avLst/>
-          </a:prstGeom>
-          <a:solidFill>
-            <a:schemeClr val="bg1"/>
-          </a:solidFill>
-          <a:ln w="9525"/>
-        </p:spPr>
-        <p:style>
-          <a:lnRef idx="2">
-            <a:schemeClr val="accent1">
-              <a:shade val="50000"/>
-            </a:schemeClr>
-          </a:lnRef>
-          <a:fillRef idx="1">
-            <a:schemeClr val="accent1"/>
-          </a:fillRef>
-          <a:effectRef idx="0">
-            <a:schemeClr val="accent1"/>
-          </a:effectRef>
-          <a:fontRef idx="minor">
-            <a:schemeClr val="lt1"/>
-          </a:fontRef>
-        </p:style>
-        <p:txBody>
-          <a:bodyPr rtlCol="0" anchor="ctr"/>
-          <a:lstStyle/>
-          <a:p>
-            <a:pPr algn="ctr"/>
-            <a:endParaRPr lang="en-US"/>
-          </a:p>
-        </p:txBody>
-      </p:sp>
-      <p:sp>
-        <p:nvSpPr>
-          <p:cNvPr id="119" name="Oval 118"/>
-          <p:cNvSpPr/>
-          <p:nvPr/>
-        </p:nvSpPr>
-        <p:spPr>
-          <a:xfrm>
-            <a:off x="4937957" y="11722423"/>
-            <a:ext cx="71925" cy="127867"/>
           </a:xfrm>
           <a:prstGeom prst="ellipse">
             <a:avLst/>
@@ -14490,111 +14348,88 @@
           </p:txBody>
         </p:sp>
       </p:grpSp>
-      <p:grpSp>
-        <p:nvGrpSpPr>
-          <p:cNvPr id="38" name="Group 37"/>
-          <p:cNvGrpSpPr/>
+      <p:sp>
+        <p:nvSpPr>
+          <p:cNvPr id="37" name="Oval 36"/>
+          <p:cNvSpPr/>
           <p:nvPr/>
-        </p:nvGrpSpPr>
-        <p:grpSpPr>
+        </p:nvSpPr>
+        <p:spPr>
           <a:xfrm>
-            <a:off x="3358659" y="6685645"/>
+            <a:off x="3510686" y="6841634"/>
+            <a:ext cx="100012" cy="179013"/>
+          </a:xfrm>
+          <a:prstGeom prst="ellipse">
+            <a:avLst/>
+          </a:prstGeom>
+          <a:solidFill>
+            <a:schemeClr val="bg1"/>
+          </a:solidFill>
+          <a:ln>
+            <a:noFill/>
+          </a:ln>
+        </p:spPr>
+        <p:style>
+          <a:lnRef idx="2">
+            <a:schemeClr val="accent1">
+              <a:shade val="50000"/>
+            </a:schemeClr>
+          </a:lnRef>
+          <a:fillRef idx="1">
+            <a:schemeClr val="accent1"/>
+          </a:fillRef>
+          <a:effectRef idx="0">
+            <a:schemeClr val="accent1"/>
+          </a:effectRef>
+          <a:fontRef idx="minor">
+            <a:schemeClr val="lt1"/>
+          </a:fontRef>
+        </p:style>
+        <p:txBody>
+          <a:bodyPr rtlCol="0" anchor="ctr"/>
+          <a:lstStyle/>
+          <a:p>
+            <a:pPr algn="ctr"/>
+            <a:endParaRPr lang="en-US"/>
+          </a:p>
+        </p:txBody>
+      </p:sp>
+      <p:sp>
+        <p:nvSpPr>
+          <p:cNvPr id="78" name="TextBox 77"/>
+          <p:cNvSpPr txBox="1"/>
+          <p:nvPr/>
+        </p:nvSpPr>
+        <p:spPr>
+          <a:xfrm>
+            <a:off x="3243122" y="7169770"/>
             <a:ext cx="503531" cy="491930"/>
-            <a:chOff x="6228184" y="3686705"/>
-            <a:chExt cx="504056" cy="276999"/>
           </a:xfrm>
-        </p:grpSpPr>
-        <p:sp>
-          <p:nvSpPr>
-            <p:cNvPr id="37" name="Oval 36"/>
-            <p:cNvSpPr/>
-            <p:nvPr/>
-          </p:nvSpPr>
-          <p:spPr>
-            <a:xfrm>
-              <a:off x="6380370" y="3774540"/>
-              <a:ext cx="100116" cy="100800"/>
-            </a:xfrm>
-            <a:prstGeom prst="ellipse">
-              <a:avLst/>
-            </a:prstGeom>
-            <a:solidFill>
-              <a:schemeClr val="bg1"/>
-            </a:solidFill>
-            <a:ln>
-              <a:noFill/>
-            </a:ln>
-          </p:spPr>
-          <p:style>
-            <a:lnRef idx="2">
-              <a:schemeClr val="accent1">
-                <a:shade val="50000"/>
-              </a:schemeClr>
-            </a:lnRef>
-            <a:fillRef idx="1">
-              <a:schemeClr val="accent1"/>
-            </a:fillRef>
-            <a:effectRef idx="0">
-              <a:schemeClr val="accent1"/>
-            </a:effectRef>
-            <a:fontRef idx="minor">
-              <a:schemeClr val="lt1"/>
-            </a:fontRef>
-          </p:style>
-          <p:txBody>
-            <a:bodyPr rtlCol="0" anchor="ctr"/>
-            <a:lstStyle/>
-            <a:p>
-              <a:pPr algn="ctr"/>
-              <a:endParaRPr lang="en-US"/>
-            </a:p>
-          </p:txBody>
-        </p:sp>
-        <p:sp>
-          <p:nvSpPr>
-            <p:cNvPr id="78" name="TextBox 77"/>
-            <p:cNvSpPr txBox="1"/>
-            <p:nvPr/>
-          </p:nvSpPr>
-          <p:spPr>
-            <a:xfrm>
-              <a:off x="6228184" y="3686705"/>
-              <a:ext cx="504056" cy="276999"/>
-            </a:xfrm>
-            <a:prstGeom prst="rect">
-              <a:avLst/>
-            </a:prstGeom>
-            <a:noFill/>
-          </p:spPr>
-          <p:txBody>
-            <a:bodyPr wrap="square" rtlCol="0">
-              <a:noAutofit/>
-            </a:bodyPr>
-            <a:lstStyle/>
-            <a:p>
-              <a:r>
-                <a:rPr lang="en-US" sz="1200" dirty="0">
-                  <a:latin typeface="Arial" panose="020B0604020202020204" pitchFamily="34" charset="0"/>
-                  <a:cs typeface="Arial" panose="020B0604020202020204" pitchFamily="34" charset="0"/>
-                </a:rPr>
-                <a:t> </a:t>
-              </a:r>
-              <a:r>
-                <a:rPr lang="en-US" sz="1200" b="1" dirty="0" smtClean="0">
-                  <a:latin typeface="Arial" panose="020B0604020202020204" pitchFamily="34" charset="0"/>
-                  <a:cs typeface="Arial" panose="020B0604020202020204" pitchFamily="34" charset="0"/>
-                  <a:sym typeface="Wingdings"/>
-                </a:rPr>
-                <a:t></a:t>
-              </a:r>
-              <a:endParaRPr lang="en-US" sz="1200" b="1" dirty="0">
-                <a:latin typeface="Arial" panose="020B0604020202020204" pitchFamily="34" charset="0"/>
-                <a:cs typeface="Arial" panose="020B0604020202020204" pitchFamily="34" charset="0"/>
-              </a:endParaRPr>
-            </a:p>
-          </p:txBody>
-        </p:sp>
-      </p:grpSp>
+          <a:prstGeom prst="rect">
+            <a:avLst/>
+          </a:prstGeom>
+          <a:noFill/>
+        </p:spPr>
+        <p:txBody>
+          <a:bodyPr wrap="square" rtlCol="0">
+            <a:noAutofit/>
+          </a:bodyPr>
+          <a:lstStyle/>
+          <a:p>
+            <a:r>
+              <a:rPr lang="en-US" sz="1200" dirty="0">
+                <a:latin typeface="Arial" panose="020B0604020202020204" pitchFamily="34" charset="0"/>
+                <a:cs typeface="Arial" panose="020B0604020202020204" pitchFamily="34" charset="0"/>
+              </a:rPr>
+              <a:t> </a:t>
+            </a:r>
+            <a:endParaRPr lang="en-US" sz="1200" b="1" dirty="0">
+              <a:latin typeface="Arial" panose="020B0604020202020204" pitchFamily="34" charset="0"/>
+              <a:cs typeface="Arial" panose="020B0604020202020204" pitchFamily="34" charset="0"/>
+            </a:endParaRPr>
+          </a:p>
+        </p:txBody>
+      </p:sp>
       <p:grpSp>
         <p:nvGrpSpPr>
           <p:cNvPr id="35" name="Group 34"/>
@@ -14789,7 +14624,7 @@
         <p:spPr>
           <a:xfrm>
             <a:off x="3068232" y="1606102"/>
-            <a:ext cx="1590179" cy="195814"/>
+            <a:ext cx="1578958" cy="226591"/>
           </a:xfrm>
           <a:prstGeom prst="rect">
             <a:avLst/>
@@ -14803,13 +14638,27 @@
           <a:lstStyle/>
           <a:p>
             <a:r>
-              <a:rPr lang="en-US" sz="800" dirty="0" smtClean="0">
-                <a:latin typeface="Arial" panose="020B0604020202020204" pitchFamily="34" charset="0"/>
-                <a:cs typeface="Arial" panose="020B0604020202020204" pitchFamily="34" charset="0"/>
-              </a:rPr>
-              <a:t>Also invokes the Payment Agent…</a:t>
-            </a:r>
-            <a:endParaRPr lang="en-US" sz="800" dirty="0">
+              <a:rPr lang="en-US" sz="1000" dirty="0" smtClean="0">
+                <a:latin typeface="Arial" panose="020B0604020202020204" pitchFamily="34" charset="0"/>
+                <a:cs typeface="Arial" panose="020B0604020202020204" pitchFamily="34" charset="0"/>
+              </a:rPr>
+              <a:t>Starts</a:t>
+            </a:r>
+            <a:r>
+              <a:rPr lang="en-US" sz="1000" dirty="0" smtClean="0">
+                <a:latin typeface="Arial" panose="020B0604020202020204" pitchFamily="34" charset="0"/>
+                <a:cs typeface="Arial" panose="020B0604020202020204" pitchFamily="34" charset="0"/>
+              </a:rPr>
+              <a:t> </a:t>
+            </a:r>
+            <a:r>
+              <a:rPr lang="en-US" sz="1000" dirty="0" smtClean="0">
+                <a:latin typeface="Arial" panose="020B0604020202020204" pitchFamily="34" charset="0"/>
+                <a:cs typeface="Arial" panose="020B0604020202020204" pitchFamily="34" charset="0"/>
+              </a:rPr>
+              <a:t>the Payment Agent…</a:t>
+            </a:r>
+            <a:endParaRPr lang="en-US" sz="1000" dirty="0">
               <a:latin typeface="Arial" panose="020B0604020202020204" pitchFamily="34" charset="0"/>
               <a:cs typeface="Arial" panose="020B0604020202020204" pitchFamily="34" charset="0"/>
             </a:endParaRPr>
@@ -15497,14 +15346,7 @@
                 <a:latin typeface="Arial" panose="020B0604020202020204" pitchFamily="34" charset="0"/>
                 <a:cs typeface="Arial" panose="020B0604020202020204" pitchFamily="34" charset="0"/>
               </a:rPr>
-              <a:t> </a:t>
-            </a:r>
-            <a:r>
-              <a:rPr lang="en-US" sz="800" dirty="0" smtClean="0">
-                <a:latin typeface="Arial" panose="020B0604020202020204" pitchFamily="34" charset="0"/>
-                <a:cs typeface="Arial" panose="020B0604020202020204" pitchFamily="34" charset="0"/>
-              </a:rPr>
-              <a:t>◄</a:t>
+              <a:t> ◄</a:t>
             </a:r>
             <a:br>
               <a:rPr lang="en-US" sz="800" dirty="0" smtClean="0">
@@ -15524,14 +15366,7 @@
                 <a:latin typeface="Arial" panose="020B0604020202020204" pitchFamily="34" charset="0"/>
                 <a:cs typeface="Arial" panose="020B0604020202020204" pitchFamily="34" charset="0"/>
               </a:rPr>
-              <a:t> (Client</a:t>
-            </a:r>
-            <a:r>
-              <a:rPr lang="en-US" sz="800" dirty="0" smtClean="0">
-                <a:latin typeface="Arial" panose="020B0604020202020204" pitchFamily="34" charset="0"/>
-                <a:cs typeface="Arial" panose="020B0604020202020204" pitchFamily="34" charset="0"/>
-              </a:rPr>
-              <a:t>)</a:t>
+              <a:t> (Client)</a:t>
             </a:r>
           </a:p>
           <a:p>
@@ -15987,8 +15822,8 @@
         </p:nvSpPr>
         <p:spPr>
           <a:xfrm>
-            <a:off x="397815" y="5339373"/>
-            <a:ext cx="785046" cy="246221"/>
+            <a:off x="352836" y="5339373"/>
+            <a:ext cx="974041" cy="246221"/>
           </a:xfrm>
           <a:prstGeom prst="rect">
             <a:avLst/>
@@ -16006,14 +15841,7 @@
                 <a:latin typeface="Arial" panose="020B0604020202020204" pitchFamily="34" charset="0"/>
                 <a:cs typeface="Arial" panose="020B0604020202020204" pitchFamily="34" charset="0"/>
               </a:rPr>
-              <a:t>“</a:t>
-            </a:r>
-            <a:r>
-              <a:rPr lang="en-US" sz="1000" dirty="0" smtClean="0">
-                <a:latin typeface="Arial" panose="020B0604020202020204" pitchFamily="34" charset="0"/>
-                <a:cs typeface="Arial" panose="020B0604020202020204" pitchFamily="34" charset="0"/>
-              </a:rPr>
-              <a:t>Accept</a:t>
+              <a:t>“User Accept</a:t>
             </a:r>
             <a:r>
               <a:rPr lang="en-US" sz="1000" dirty="0" smtClean="0">
@@ -16037,7 +15865,7 @@
         </p:nvSpPr>
         <p:spPr>
           <a:xfrm>
-            <a:off x="3692193" y="7879978"/>
+            <a:off x="3692193" y="7807515"/>
             <a:ext cx="442996" cy="153888"/>
           </a:xfrm>
           <a:prstGeom prst="rect">
@@ -16095,6 +15923,358 @@
                   <a:lumOff val="35000"/>
                 </a:schemeClr>
               </a:solidFill>
+              <a:latin typeface="Arial" panose="020B0604020202020204" pitchFamily="34" charset="0"/>
+              <a:cs typeface="Arial" panose="020B0604020202020204" pitchFamily="34" charset="0"/>
+            </a:endParaRPr>
+          </a:p>
+        </p:txBody>
+      </p:sp>
+      <p:grpSp>
+        <p:nvGrpSpPr>
+          <p:cNvPr id="117" name="Group 116"/>
+          <p:cNvGrpSpPr/>
+          <p:nvPr/>
+        </p:nvGrpSpPr>
+        <p:grpSpPr>
+          <a:xfrm>
+            <a:off x="6702433" y="9298482"/>
+            <a:ext cx="1286438" cy="1183656"/>
+            <a:chOff x="713027" y="4336594"/>
+            <a:chExt cx="1286438" cy="1183656"/>
+          </a:xfrm>
+        </p:grpSpPr>
+        <p:sp>
+          <p:nvSpPr>
+            <p:cNvPr id="118" name="Rectangle 117"/>
+            <p:cNvSpPr/>
+            <p:nvPr/>
+          </p:nvSpPr>
+          <p:spPr>
+            <a:xfrm>
+              <a:off x="713027" y="4336594"/>
+              <a:ext cx="1286438" cy="1183656"/>
+            </a:xfrm>
+            <a:prstGeom prst="rect">
+              <a:avLst/>
+            </a:prstGeom>
+            <a:solidFill>
+              <a:srgbClr val="FEFEDE"/>
+            </a:solidFill>
+            <a:ln w="15875">
+              <a:solidFill>
+                <a:srgbClr val="FF0000"/>
+              </a:solidFill>
+            </a:ln>
+          </p:spPr>
+          <p:style>
+            <a:lnRef idx="2">
+              <a:schemeClr val="accent1">
+                <a:shade val="50000"/>
+              </a:schemeClr>
+            </a:lnRef>
+            <a:fillRef idx="1">
+              <a:schemeClr val="accent1"/>
+            </a:fillRef>
+            <a:effectRef idx="0">
+              <a:schemeClr val="accent1"/>
+            </a:effectRef>
+            <a:fontRef idx="minor">
+              <a:schemeClr val="lt1"/>
+            </a:fontRef>
+          </p:style>
+          <p:txBody>
+            <a:bodyPr rtlCol="0" anchor="ctr"/>
+            <a:lstStyle/>
+            <a:p>
+              <a:endParaRPr lang="en-US" dirty="0"/>
+            </a:p>
+          </p:txBody>
+        </p:sp>
+        <p:sp>
+          <p:nvSpPr>
+            <p:cNvPr id="120" name="TextBox 119"/>
+            <p:cNvSpPr txBox="1"/>
+            <p:nvPr/>
+          </p:nvSpPr>
+          <p:spPr>
+            <a:xfrm>
+              <a:off x="713027" y="4368122"/>
+              <a:ext cx="1152880" cy="1115690"/>
+            </a:xfrm>
+            <a:prstGeom prst="rect">
+              <a:avLst/>
+            </a:prstGeom>
+            <a:noFill/>
+          </p:spPr>
+          <p:txBody>
+            <a:bodyPr wrap="none" rtlCol="0">
+              <a:spAutoFit/>
+            </a:bodyPr>
+            <a:lstStyle/>
+            <a:p>
+              <a:r>
+                <a:rPr lang="en-US" sz="800" dirty="0">
+                  <a:latin typeface="Arial" panose="020B0604020202020204" pitchFamily="34" charset="0"/>
+                  <a:cs typeface="Arial" panose="020B0604020202020204" pitchFamily="34" charset="0"/>
+                </a:rPr>
+                <a:t>P</a:t>
+              </a:r>
+              <a:r>
+                <a:rPr lang="en-US" sz="800" dirty="0" smtClean="0">
+                  <a:latin typeface="Arial" panose="020B0604020202020204" pitchFamily="34" charset="0"/>
+                  <a:cs typeface="Arial" panose="020B0604020202020204" pitchFamily="34" charset="0"/>
+                </a:rPr>
+                <a:t>ayee</a:t>
+              </a:r>
+              <a:br>
+                <a:rPr lang="en-US" sz="800" dirty="0" smtClean="0">
+                  <a:latin typeface="Arial" panose="020B0604020202020204" pitchFamily="34" charset="0"/>
+                  <a:cs typeface="Arial" panose="020B0604020202020204" pitchFamily="34" charset="0"/>
+                </a:rPr>
+              </a:br>
+              <a:r>
+                <a:rPr lang="en-US" sz="800" dirty="0">
+                  <a:latin typeface="Arial" panose="020B0604020202020204" pitchFamily="34" charset="0"/>
+                  <a:cs typeface="Arial" panose="020B0604020202020204" pitchFamily="34" charset="0"/>
+                </a:rPr>
+                <a:t>A</a:t>
+              </a:r>
+              <a:r>
+                <a:rPr lang="en-US" sz="800" dirty="0" smtClean="0">
+                  <a:latin typeface="Arial" panose="020B0604020202020204" pitchFamily="34" charset="0"/>
+                  <a:cs typeface="Arial" panose="020B0604020202020204" pitchFamily="34" charset="0"/>
+                </a:rPr>
+                <a:t>mount</a:t>
+              </a:r>
+              <a:br>
+                <a:rPr lang="en-US" sz="800" dirty="0" smtClean="0">
+                  <a:latin typeface="Arial" panose="020B0604020202020204" pitchFamily="34" charset="0"/>
+                  <a:cs typeface="Arial" panose="020B0604020202020204" pitchFamily="34" charset="0"/>
+                </a:rPr>
+              </a:br>
+              <a:r>
+                <a:rPr lang="en-US" sz="800" dirty="0">
+                  <a:latin typeface="Arial" panose="020B0604020202020204" pitchFamily="34" charset="0"/>
+                  <a:cs typeface="Arial" panose="020B0604020202020204" pitchFamily="34" charset="0"/>
+                </a:rPr>
+                <a:t>C</a:t>
+              </a:r>
+              <a:r>
+                <a:rPr lang="en-US" sz="800" dirty="0" smtClean="0">
+                  <a:latin typeface="Arial" panose="020B0604020202020204" pitchFamily="34" charset="0"/>
+                  <a:cs typeface="Arial" panose="020B0604020202020204" pitchFamily="34" charset="0"/>
+                </a:rPr>
+                <a:t>urrency</a:t>
+              </a:r>
+              <a:br>
+                <a:rPr lang="en-US" sz="800" dirty="0" smtClean="0">
+                  <a:latin typeface="Arial" panose="020B0604020202020204" pitchFamily="34" charset="0"/>
+                  <a:cs typeface="Arial" panose="020B0604020202020204" pitchFamily="34" charset="0"/>
+                </a:rPr>
+              </a:br>
+              <a:r>
+                <a:rPr lang="en-US" sz="800" dirty="0" err="1" smtClean="0">
+                  <a:latin typeface="Arial" panose="020B0604020202020204" pitchFamily="34" charset="0"/>
+                  <a:cs typeface="Arial" panose="020B0604020202020204" pitchFamily="34" charset="0"/>
+                </a:rPr>
+                <a:t>ReferenceID</a:t>
+              </a:r>
+              <a:r>
+                <a:rPr lang="en-US" sz="800" dirty="0" smtClean="0">
+                  <a:latin typeface="Arial" panose="020B0604020202020204" pitchFamily="34" charset="0"/>
+                  <a:cs typeface="Arial" panose="020B0604020202020204" pitchFamily="34" charset="0"/>
+                </a:rPr>
+                <a:t> (Payee)</a:t>
+              </a:r>
+            </a:p>
+            <a:p>
+              <a:r>
+                <a:rPr lang="en-US" sz="800" dirty="0" err="1" smtClean="0">
+                  <a:latin typeface="Arial" panose="020B0604020202020204" pitchFamily="34" charset="0"/>
+                  <a:cs typeface="Arial" panose="020B0604020202020204" pitchFamily="34" charset="0"/>
+                </a:rPr>
+                <a:t>DateTime</a:t>
+              </a:r>
+              <a:r>
+                <a:rPr lang="en-US" sz="800" dirty="0" smtClean="0">
+                  <a:latin typeface="Arial" panose="020B0604020202020204" pitchFamily="34" charset="0"/>
+                  <a:cs typeface="Arial" panose="020B0604020202020204" pitchFamily="34" charset="0"/>
+                </a:rPr>
+                <a:t> (Payee)</a:t>
+              </a:r>
+            </a:p>
+            <a:p>
+              <a:r>
+                <a:rPr lang="en-US" sz="800" dirty="0" err="1" smtClean="0">
+                  <a:latin typeface="Arial" panose="020B0604020202020204" pitchFamily="34" charset="0"/>
+                  <a:cs typeface="Arial" panose="020B0604020202020204" pitchFamily="34" charset="0"/>
+                </a:rPr>
+                <a:t>SoftwareID</a:t>
+              </a:r>
+              <a:endParaRPr lang="en-US" sz="800" dirty="0" smtClean="0">
+                <a:latin typeface="Arial" panose="020B0604020202020204" pitchFamily="34" charset="0"/>
+                <a:cs typeface="Arial" panose="020B0604020202020204" pitchFamily="34" charset="0"/>
+              </a:endParaRPr>
+            </a:p>
+            <a:p>
+              <a:r>
+                <a:rPr lang="en-US" sz="800" dirty="0" err="1" smtClean="0">
+                  <a:latin typeface="Arial" panose="020B0604020202020204" pitchFamily="34" charset="0"/>
+                  <a:cs typeface="Arial" panose="020B0604020202020204" pitchFamily="34" charset="0"/>
+                </a:rPr>
+                <a:t>SoftwareVersion</a:t>
+              </a:r>
+              <a:endParaRPr lang="en-US" sz="800" dirty="0">
+                <a:latin typeface="Arial" panose="020B0604020202020204" pitchFamily="34" charset="0"/>
+                <a:cs typeface="Arial" panose="020B0604020202020204" pitchFamily="34" charset="0"/>
+              </a:endParaRPr>
+            </a:p>
+            <a:p>
+              <a:pPr>
+                <a:spcBef>
+                  <a:spcPts val="300"/>
+                </a:spcBef>
+              </a:pPr>
+              <a:r>
+                <a:rPr lang="en-US" sz="800" b="1" dirty="0" smtClean="0">
+                  <a:latin typeface="Arial" panose="020B0604020202020204" pitchFamily="34" charset="0"/>
+                  <a:cs typeface="Arial" panose="020B0604020202020204" pitchFamily="34" charset="0"/>
+                </a:rPr>
+                <a:t>Signature</a:t>
+              </a:r>
+              <a:r>
+                <a:rPr lang="en-US" sz="800" dirty="0" smtClean="0">
+                  <a:latin typeface="Arial" panose="020B0604020202020204" pitchFamily="34" charset="0"/>
+                  <a:cs typeface="Arial" panose="020B0604020202020204" pitchFamily="34" charset="0"/>
+                </a:rPr>
+                <a:t> (Payee)</a:t>
+              </a:r>
+              <a:endParaRPr lang="en-US" sz="800" dirty="0">
+                <a:latin typeface="Arial" panose="020B0604020202020204" pitchFamily="34" charset="0"/>
+                <a:cs typeface="Arial" panose="020B0604020202020204" pitchFamily="34" charset="0"/>
+              </a:endParaRPr>
+            </a:p>
+          </p:txBody>
+        </p:sp>
+      </p:grpSp>
+      <p:cxnSp>
+        <p:nvCxnSpPr>
+          <p:cNvPr id="124" name="Straight Connector 123"/>
+          <p:cNvCxnSpPr/>
+          <p:nvPr/>
+        </p:nvCxnSpPr>
+        <p:spPr>
+          <a:xfrm flipV="1">
+            <a:off x="2812843" y="11419721"/>
+            <a:ext cx="2139504" cy="903"/>
+          </a:xfrm>
+          <a:prstGeom prst="line">
+            <a:avLst/>
+          </a:prstGeom>
+          <a:ln w="6350">
+            <a:solidFill>
+              <a:schemeClr val="tx1"/>
+            </a:solidFill>
+            <a:prstDash val="lgDash"/>
+            <a:tailEnd type="none" w="sm" len="sm"/>
+          </a:ln>
+        </p:spPr>
+        <p:style>
+          <a:lnRef idx="1">
+            <a:schemeClr val="accent1"/>
+          </a:lnRef>
+          <a:fillRef idx="0">
+            <a:schemeClr val="accent1"/>
+          </a:fillRef>
+          <a:effectRef idx="0">
+            <a:schemeClr val="accent1"/>
+          </a:effectRef>
+          <a:fontRef idx="minor">
+            <a:schemeClr val="tx1"/>
+          </a:fontRef>
+        </p:style>
+      </p:cxnSp>
+      <p:sp>
+        <p:nvSpPr>
+          <p:cNvPr id="130" name="Oval 129"/>
+          <p:cNvSpPr/>
+          <p:nvPr/>
+        </p:nvSpPr>
+        <p:spPr>
+          <a:xfrm>
+            <a:off x="4919891" y="11365433"/>
+            <a:ext cx="108000" cy="108000"/>
+          </a:xfrm>
+          <a:prstGeom prst="ellipse">
+            <a:avLst/>
+          </a:prstGeom>
+          <a:solidFill>
+            <a:schemeClr val="bg1"/>
+          </a:solidFill>
+          <a:ln w="9525"/>
+        </p:spPr>
+        <p:style>
+          <a:lnRef idx="2">
+            <a:schemeClr val="accent1">
+              <a:shade val="50000"/>
+            </a:schemeClr>
+          </a:lnRef>
+          <a:fillRef idx="1">
+            <a:schemeClr val="accent1"/>
+          </a:fillRef>
+          <a:effectRef idx="0">
+            <a:schemeClr val="accent1"/>
+          </a:effectRef>
+          <a:fontRef idx="minor">
+            <a:schemeClr val="lt1"/>
+          </a:fontRef>
+        </p:style>
+        <p:txBody>
+          <a:bodyPr rtlCol="0" anchor="ctr"/>
+          <a:lstStyle/>
+          <a:p>
+            <a:pPr algn="ctr"/>
+            <a:endParaRPr lang="en-US"/>
+          </a:p>
+        </p:txBody>
+      </p:sp>
+      <p:sp>
+        <p:nvSpPr>
+          <p:cNvPr id="131" name="TextBox 130"/>
+          <p:cNvSpPr txBox="1"/>
+          <p:nvPr/>
+        </p:nvSpPr>
+        <p:spPr>
+          <a:xfrm>
+            <a:off x="2983061" y="11191651"/>
+            <a:ext cx="1885131" cy="226591"/>
+          </a:xfrm>
+          <a:prstGeom prst="rect">
+            <a:avLst/>
+          </a:prstGeom>
+          <a:noFill/>
+        </p:spPr>
+        <p:txBody>
+          <a:bodyPr wrap="none" lIns="0" tIns="36000" rIns="0" bIns="36000" rtlCol="0">
+            <a:spAutoFit/>
+          </a:bodyPr>
+          <a:lstStyle/>
+          <a:p>
+            <a:r>
+              <a:rPr lang="en-US" sz="1000" dirty="0" smtClean="0">
+                <a:latin typeface="Arial" panose="020B0604020202020204" pitchFamily="34" charset="0"/>
+                <a:cs typeface="Arial" panose="020B0604020202020204" pitchFamily="34" charset="0"/>
+              </a:rPr>
+              <a:t>Terminates </a:t>
+            </a:r>
+            <a:r>
+              <a:rPr lang="en-US" sz="1000" dirty="0" smtClean="0">
+                <a:latin typeface="Arial" panose="020B0604020202020204" pitchFamily="34" charset="0"/>
+                <a:cs typeface="Arial" panose="020B0604020202020204" pitchFamily="34" charset="0"/>
+              </a:rPr>
+              <a:t>the Payment Agent…</a:t>
+            </a:r>
+            <a:endParaRPr lang="en-US" sz="1000" dirty="0">
               <a:latin typeface="Arial" panose="020B0604020202020204" pitchFamily="34" charset="0"/>
               <a:cs typeface="Arial" panose="020B0604020202020204" pitchFamily="34" charset="0"/>
             </a:endParaRPr>

</xml_diff>